<commit_message>
Started work on LoginFrame.java
</commit_message>
<xml_diff>
--- a/docs/GUI Designs/loginGUI.pptx
+++ b/docs/GUI Designs/loginGUI.pptx
@@ -195,7 +195,7 @@
           <a:p>
             <a:fld id="{3405A7E7-8218-4D16-9972-98157453E186}" type="datetimeFigureOut">
               <a:rPr lang="en-US" smtClean="0"/>
-              <a:t>7/16/2013</a:t>
+              <a:t>7/20/2013</a:t>
             </a:fld>
             <a:endParaRPr lang="en-US"/>
           </a:p>
@@ -520,7 +520,7 @@
             </a:r>
             <a:r>
               <a:rPr lang="en-US" dirty="0" err="1" smtClean="0"/>
-              <a:t>JLabel</a:t>
+              <a:t>JPanel</a:t>
             </a:r>
             <a:endParaRPr lang="en-US" dirty="0" smtClean="0"/>
           </a:p>
@@ -530,13 +530,6 @@
               <a:t>	</a:t>
             </a:r>
             <a:r>
-              <a:rPr lang="en-US" dirty="0" err="1" smtClean="0"/>
-              <a:t>JTextField</a:t>
-            </a:r>
-            <a:endParaRPr lang="en-US" dirty="0" smtClean="0"/>
-          </a:p>
-          <a:p>
-            <a:r>
               <a:rPr lang="en-US" dirty="0" smtClean="0"/>
               <a:t>	</a:t>
             </a:r>
@@ -547,6 +540,54 @@
             <a:endParaRPr lang="en-US" dirty="0" smtClean="0"/>
           </a:p>
           <a:p>
+            <a:r>
+              <a:rPr lang="en-US" dirty="0" smtClean="0"/>
+              <a:t>	</a:t>
+            </a:r>
+            <a:r>
+              <a:rPr lang="en-US" dirty="0" smtClean="0"/>
+              <a:t>	</a:t>
+            </a:r>
+            <a:r>
+              <a:rPr lang="en-US" dirty="0" err="1" smtClean="0"/>
+              <a:t>JFormattedTextField</a:t>
+            </a:r>
+            <a:endParaRPr lang="en-US" dirty="0" smtClean="0"/>
+          </a:p>
+          <a:p>
+            <a:r>
+              <a:rPr lang="en-US" dirty="0" smtClean="0"/>
+              <a:t>	</a:t>
+            </a:r>
+            <a:r>
+              <a:rPr lang="en-US" dirty="0" smtClean="0"/>
+              <a:t>	</a:t>
+            </a:r>
+            <a:r>
+              <a:rPr lang="en-US" dirty="0" err="1" smtClean="0"/>
+              <a:t>JLabel</a:t>
+            </a:r>
+            <a:r>
+              <a:rPr lang="en-US" baseline="0" dirty="0" smtClean="0"/>
+              <a:t> </a:t>
+            </a:r>
+          </a:p>
+          <a:p>
+            <a:r>
+              <a:rPr lang="en-US" baseline="0" dirty="0" smtClean="0"/>
+              <a:t>	</a:t>
+            </a:r>
+            <a:r>
+              <a:rPr lang="en-US" baseline="0" dirty="0" err="1" smtClean="0"/>
+              <a:t>JPanel</a:t>
+            </a:r>
+            <a:endParaRPr lang="en-US" dirty="0" smtClean="0"/>
+          </a:p>
+          <a:p>
+            <a:r>
+              <a:rPr lang="en-US" dirty="0" smtClean="0"/>
+              <a:t>	</a:t>
+            </a:r>
             <a:r>
               <a:rPr lang="en-US" dirty="0" smtClean="0"/>
               <a:t>	</a:t>
@@ -663,7 +704,7 @@
             </a:r>
             <a:r>
               <a:rPr lang="en-US" dirty="0" err="1" smtClean="0"/>
-              <a:t>JTextField</a:t>
+              <a:t>JFormattedTextField</a:t>
             </a:r>
             <a:endParaRPr lang="en-US" dirty="0" smtClean="0"/>
           </a:p>
@@ -809,7 +850,7 @@
             </a:r>
             <a:r>
               <a:rPr lang="en-US" dirty="0" err="1" smtClean="0"/>
-              <a:t>JTextField</a:t>
+              <a:t>JFormattedTextField</a:t>
             </a:r>
             <a:endParaRPr lang="en-US" dirty="0" smtClean="0"/>
           </a:p>
@@ -844,9 +885,6 @@
               <a:rPr lang="en-US" dirty="0" err="1" smtClean="0"/>
               <a:t>JButton</a:t>
             </a:r>
-            <a:endParaRPr lang="en-US" dirty="0" smtClean="0"/>
-          </a:p>
-          <a:p>
             <a:endParaRPr lang="en-US" dirty="0" smtClean="0"/>
           </a:p>
           <a:p>
@@ -958,7 +996,7 @@
             </a:r>
             <a:r>
               <a:rPr lang="en-US" dirty="0" err="1" smtClean="0"/>
-              <a:t>JTextField</a:t>
+              <a:t>JFormattedTextField</a:t>
             </a:r>
             <a:endParaRPr lang="en-US" dirty="0" smtClean="0"/>
           </a:p>
@@ -993,13 +1031,10 @@
               <a:rPr lang="en-US" dirty="0" err="1" smtClean="0"/>
               <a:t>JButton</a:t>
             </a:r>
-            <a:endParaRPr lang="en-US" dirty="0" smtClean="0"/>
-          </a:p>
-          <a:p>
             <a:endParaRPr lang="en-US" smtClean="0"/>
           </a:p>
           <a:p>
-            <a:endParaRPr lang="en-US"/>
+            <a:endParaRPr lang="en-US" dirty="0"/>
           </a:p>
         </p:txBody>
       </p:sp>
@@ -1220,7 +1255,7 @@
           <a:p>
             <a:fld id="{89A9147A-1CBB-4AE9-96D0-D97E77D2BDCC}" type="datetimeFigureOut">
               <a:rPr lang="en-US" smtClean="0"/>
-              <a:t>7/16/2013</a:t>
+              <a:t>7/20/2013</a:t>
             </a:fld>
             <a:endParaRPr lang="en-US"/>
           </a:p>
@@ -1390,7 +1425,7 @@
           <a:p>
             <a:fld id="{89A9147A-1CBB-4AE9-96D0-D97E77D2BDCC}" type="datetimeFigureOut">
               <a:rPr lang="en-US" smtClean="0"/>
-              <a:t>7/16/2013</a:t>
+              <a:t>7/20/2013</a:t>
             </a:fld>
             <a:endParaRPr lang="en-US"/>
           </a:p>
@@ -1570,7 +1605,7 @@
           <a:p>
             <a:fld id="{89A9147A-1CBB-4AE9-96D0-D97E77D2BDCC}" type="datetimeFigureOut">
               <a:rPr lang="en-US" smtClean="0"/>
-              <a:t>7/16/2013</a:t>
+              <a:t>7/20/2013</a:t>
             </a:fld>
             <a:endParaRPr lang="en-US"/>
           </a:p>
@@ -1740,7 +1775,7 @@
           <a:p>
             <a:fld id="{89A9147A-1CBB-4AE9-96D0-D97E77D2BDCC}" type="datetimeFigureOut">
               <a:rPr lang="en-US" smtClean="0"/>
-              <a:t>7/16/2013</a:t>
+              <a:t>7/20/2013</a:t>
             </a:fld>
             <a:endParaRPr lang="en-US"/>
           </a:p>
@@ -1986,7 +2021,7 @@
           <a:p>
             <a:fld id="{89A9147A-1CBB-4AE9-96D0-D97E77D2BDCC}" type="datetimeFigureOut">
               <a:rPr lang="en-US" smtClean="0"/>
-              <a:t>7/16/2013</a:t>
+              <a:t>7/20/2013</a:t>
             </a:fld>
             <a:endParaRPr lang="en-US"/>
           </a:p>
@@ -2274,7 +2309,7 @@
           <a:p>
             <a:fld id="{89A9147A-1CBB-4AE9-96D0-D97E77D2BDCC}" type="datetimeFigureOut">
               <a:rPr lang="en-US" smtClean="0"/>
-              <a:t>7/16/2013</a:t>
+              <a:t>7/20/2013</a:t>
             </a:fld>
             <a:endParaRPr lang="en-US"/>
           </a:p>
@@ -2696,7 +2731,7 @@
           <a:p>
             <a:fld id="{89A9147A-1CBB-4AE9-96D0-D97E77D2BDCC}" type="datetimeFigureOut">
               <a:rPr lang="en-US" smtClean="0"/>
-              <a:t>7/16/2013</a:t>
+              <a:t>7/20/2013</a:t>
             </a:fld>
             <a:endParaRPr lang="en-US"/>
           </a:p>
@@ -2814,7 +2849,7 @@
           <a:p>
             <a:fld id="{89A9147A-1CBB-4AE9-96D0-D97E77D2BDCC}" type="datetimeFigureOut">
               <a:rPr lang="en-US" smtClean="0"/>
-              <a:t>7/16/2013</a:t>
+              <a:t>7/20/2013</a:t>
             </a:fld>
             <a:endParaRPr lang="en-US"/>
           </a:p>
@@ -2909,7 +2944,7 @@
           <a:p>
             <a:fld id="{89A9147A-1CBB-4AE9-96D0-D97E77D2BDCC}" type="datetimeFigureOut">
               <a:rPr lang="en-US" smtClean="0"/>
-              <a:t>7/16/2013</a:t>
+              <a:t>7/20/2013</a:t>
             </a:fld>
             <a:endParaRPr lang="en-US"/>
           </a:p>
@@ -3186,7 +3221,7 @@
           <a:p>
             <a:fld id="{89A9147A-1CBB-4AE9-96D0-D97E77D2BDCC}" type="datetimeFigureOut">
               <a:rPr lang="en-US" smtClean="0"/>
-              <a:t>7/16/2013</a:t>
+              <a:t>7/20/2013</a:t>
             </a:fld>
             <a:endParaRPr lang="en-US"/>
           </a:p>
@@ -3439,7 +3474,7 @@
           <a:p>
             <a:fld id="{89A9147A-1CBB-4AE9-96D0-D97E77D2BDCC}" type="datetimeFigureOut">
               <a:rPr lang="en-US" smtClean="0"/>
-              <a:t>7/16/2013</a:t>
+              <a:t>7/20/2013</a:t>
             </a:fld>
             <a:endParaRPr lang="en-US"/>
           </a:p>
@@ -3652,7 +3687,7 @@
           <a:p>
             <a:fld id="{89A9147A-1CBB-4AE9-96D0-D97E77D2BDCC}" type="datetimeFigureOut">
               <a:rPr lang="en-US" smtClean="0"/>
-              <a:t>7/16/2013</a:t>
+              <a:t>7/20/2013</a:t>
             </a:fld>
             <a:endParaRPr lang="en-US"/>
           </a:p>

</xml_diff>